<commit_message>
improve figure 8.16 battery
</commit_message>
<xml_diff>
--- a/Figures/Chapter_08/Figure8.16new.pptx
+++ b/Figures/Chapter_08/Figure8.16new.pptx
@@ -5,7 +5,7 @@
     <p:sldMasterId id="2147483648" r:id="rId1"/>
   </p:sldMasterIdLst>
   <p:sldIdLst>
-    <p:sldId id="258" r:id="rId2"/>
+    <p:sldId id="259" r:id="rId2"/>
   </p:sldIdLst>
   <p:sldSz cx="12192000" cy="6858000"/>
   <p:notesSz cx="6858000" cy="9144000"/>
@@ -261,7 +261,7 @@
           <a:p>
             <a:fld id="{6A1B2874-E0C2-47F1-AC58-11F2372F713B}" type="datetimeFigureOut">
               <a:rPr lang="en-GB" smtClean="0"/>
-              <a:t>16/12/2022</a:t>
+              <a:t>08/03/2023</a:t>
             </a:fld>
             <a:endParaRPr lang="en-GB"/>
           </a:p>
@@ -461,7 +461,7 @@
           <a:p>
             <a:fld id="{6A1B2874-E0C2-47F1-AC58-11F2372F713B}" type="datetimeFigureOut">
               <a:rPr lang="en-GB" smtClean="0"/>
-              <a:t>16/12/2022</a:t>
+              <a:t>08/03/2023</a:t>
             </a:fld>
             <a:endParaRPr lang="en-GB"/>
           </a:p>
@@ -671,7 +671,7 @@
           <a:p>
             <a:fld id="{6A1B2874-E0C2-47F1-AC58-11F2372F713B}" type="datetimeFigureOut">
               <a:rPr lang="en-GB" smtClean="0"/>
-              <a:t>16/12/2022</a:t>
+              <a:t>08/03/2023</a:t>
             </a:fld>
             <a:endParaRPr lang="en-GB"/>
           </a:p>
@@ -871,7 +871,7 @@
           <a:p>
             <a:fld id="{6A1B2874-E0C2-47F1-AC58-11F2372F713B}" type="datetimeFigureOut">
               <a:rPr lang="en-GB" smtClean="0"/>
-              <a:t>16/12/2022</a:t>
+              <a:t>08/03/2023</a:t>
             </a:fld>
             <a:endParaRPr lang="en-GB"/>
           </a:p>
@@ -1147,7 +1147,7 @@
           <a:p>
             <a:fld id="{6A1B2874-E0C2-47F1-AC58-11F2372F713B}" type="datetimeFigureOut">
               <a:rPr lang="en-GB" smtClean="0"/>
-              <a:t>16/12/2022</a:t>
+              <a:t>08/03/2023</a:t>
             </a:fld>
             <a:endParaRPr lang="en-GB"/>
           </a:p>
@@ -1415,7 +1415,7 @@
           <a:p>
             <a:fld id="{6A1B2874-E0C2-47F1-AC58-11F2372F713B}" type="datetimeFigureOut">
               <a:rPr lang="en-GB" smtClean="0"/>
-              <a:t>16/12/2022</a:t>
+              <a:t>08/03/2023</a:t>
             </a:fld>
             <a:endParaRPr lang="en-GB"/>
           </a:p>
@@ -1830,7 +1830,7 @@
           <a:p>
             <a:fld id="{6A1B2874-E0C2-47F1-AC58-11F2372F713B}" type="datetimeFigureOut">
               <a:rPr lang="en-GB" smtClean="0"/>
-              <a:t>16/12/2022</a:t>
+              <a:t>08/03/2023</a:t>
             </a:fld>
             <a:endParaRPr lang="en-GB"/>
           </a:p>
@@ -1972,7 +1972,7 @@
           <a:p>
             <a:fld id="{6A1B2874-E0C2-47F1-AC58-11F2372F713B}" type="datetimeFigureOut">
               <a:rPr lang="en-GB" smtClean="0"/>
-              <a:t>16/12/2022</a:t>
+              <a:t>08/03/2023</a:t>
             </a:fld>
             <a:endParaRPr lang="en-GB"/>
           </a:p>
@@ -2085,7 +2085,7 @@
           <a:p>
             <a:fld id="{6A1B2874-E0C2-47F1-AC58-11F2372F713B}" type="datetimeFigureOut">
               <a:rPr lang="en-GB" smtClean="0"/>
-              <a:t>16/12/2022</a:t>
+              <a:t>08/03/2023</a:t>
             </a:fld>
             <a:endParaRPr lang="en-GB"/>
           </a:p>
@@ -2398,7 +2398,7 @@
           <a:p>
             <a:fld id="{6A1B2874-E0C2-47F1-AC58-11F2372F713B}" type="datetimeFigureOut">
               <a:rPr lang="en-GB" smtClean="0"/>
-              <a:t>16/12/2022</a:t>
+              <a:t>08/03/2023</a:t>
             </a:fld>
             <a:endParaRPr lang="en-GB"/>
           </a:p>
@@ -2687,7 +2687,7 @@
           <a:p>
             <a:fld id="{6A1B2874-E0C2-47F1-AC58-11F2372F713B}" type="datetimeFigureOut">
               <a:rPr lang="en-GB" smtClean="0"/>
-              <a:t>16/12/2022</a:t>
+              <a:t>08/03/2023</a:t>
             </a:fld>
             <a:endParaRPr lang="en-GB"/>
           </a:p>
@@ -2930,7 +2930,7 @@
           <a:p>
             <a:fld id="{6A1B2874-E0C2-47F1-AC58-11F2372F713B}" type="datetimeFigureOut">
               <a:rPr lang="en-GB" smtClean="0"/>
-              <a:t>16/12/2022</a:t>
+              <a:t>08/03/2023</a:t>
             </a:fld>
             <a:endParaRPr lang="en-GB"/>
           </a:p>
@@ -3347,6 +3347,36 @@
           <a:chExt cx="0" cy="0"/>
         </a:xfrm>
       </p:grpSpPr>
+      <p:pic>
+        <p:nvPicPr>
+          <p:cNvPr id="10" name="Picture 9" descr="Diagram&#10;&#10;Description automatically generated">
+            <a:extLst>
+              <a:ext uri="{FF2B5EF4-FFF2-40B4-BE49-F238E27FC236}">
+                <a16:creationId xmlns:a16="http://schemas.microsoft.com/office/drawing/2014/main" id="{6D7B2DF3-34C4-9291-F037-74E8EB0A2D1B}"/>
+              </a:ext>
+            </a:extLst>
+          </p:cNvPr>
+          <p:cNvPicPr>
+            <a:picLocks noChangeAspect="1"/>
+          </p:cNvPicPr>
+          <p:nvPr/>
+        </p:nvPicPr>
+        <p:blipFill>
+          <a:blip r:embed="rId2"/>
+          <a:stretch>
+            <a:fillRect/>
+          </a:stretch>
+        </p:blipFill>
+        <p:spPr>
+          <a:xfrm>
+            <a:off x="-2100" y="65108"/>
+            <a:ext cx="6534912" cy="4389120"/>
+          </a:xfrm>
+          <a:prstGeom prst="rect">
+            <a:avLst/>
+          </a:prstGeom>
+        </p:spPr>
+      </p:pic>
       <p:sp>
         <p:nvSpPr>
           <p:cNvPr id="4" name="Rectangle 2">
@@ -3416,85 +3446,6 @@
           </a:p>
         </p:txBody>
       </p:sp>
-      <p:graphicFrame>
-        <p:nvGraphicFramePr>
-          <p:cNvPr id="5" name="Object 4">
-            <a:extLst>
-              <a:ext uri="{FF2B5EF4-FFF2-40B4-BE49-F238E27FC236}">
-                <a16:creationId xmlns:a16="http://schemas.microsoft.com/office/drawing/2014/main" id="{21F346CD-26F2-48D0-9D34-E22C2F92FCE8}"/>
-              </a:ext>
-            </a:extLst>
-          </p:cNvPr>
-          <p:cNvGraphicFramePr>
-            <a:graphicFrameLocks noChangeAspect="1"/>
-          </p:cNvGraphicFramePr>
-          <p:nvPr>
-            <p:extLst>
-              <p:ext uri="{D42A27DB-BD31-4B8C-83A1-F6EECF244321}">
-                <p14:modId xmlns:p14="http://schemas.microsoft.com/office/powerpoint/2010/main" val="313825077"/>
-              </p:ext>
-            </p:extLst>
-          </p:nvPr>
-        </p:nvGraphicFramePr>
-        <p:xfrm>
-          <a:off x="39631" y="224908"/>
-          <a:ext cx="5458905" cy="3666633"/>
-        </p:xfrm>
-        <a:graphic>
-          <a:graphicData uri="http://schemas.openxmlformats.org/presentationml/2006/ole">
-            <mc:AlternateContent xmlns:mc="http://schemas.openxmlformats.org/markup-compatibility/2006">
-              <mc:Choice xmlns:v="urn:schemas-microsoft-com:vml" Requires="v">
-                <p:oleObj spid="_x0000_s3075" name="Bitmap Image" r:id="rId3" imgW="3780952" imgH="2553056" progId="PBrush">
-                  <p:embed/>
-                </p:oleObj>
-              </mc:Choice>
-              <mc:Fallback>
-                <p:oleObj name="Bitmap Image" r:id="rId3" imgW="3780952" imgH="2553056" progId="PBrush">
-                  <p:embed/>
-                  <p:pic>
-                    <p:nvPicPr>
-                      <p:cNvPr id="5" name="Object 4">
-                        <a:extLst>
-                          <a:ext uri="{FF2B5EF4-FFF2-40B4-BE49-F238E27FC236}">
-                            <a16:creationId xmlns:a16="http://schemas.microsoft.com/office/drawing/2014/main" id="{21F346CD-26F2-48D0-9D34-E22C2F92FCE8}"/>
-                          </a:ext>
-                        </a:extLst>
-                      </p:cNvPr>
-                      <p:cNvPicPr>
-                        <a:picLocks noChangeAspect="1" noChangeArrowheads="1"/>
-                      </p:cNvPicPr>
-                      <p:nvPr/>
-                    </p:nvPicPr>
-                    <p:blipFill>
-                      <a:blip r:embed="rId4">
-                        <a:extLst>
-                          <a:ext uri="{28A0092B-C50C-407E-A947-70E740481C1C}">
-                            <a14:useLocalDpi xmlns:a14="http://schemas.microsoft.com/office/drawing/2010/main" val="0"/>
-                          </a:ext>
-                        </a:extLst>
-                      </a:blip>
-                      <a:srcRect/>
-                      <a:stretch>
-                        <a:fillRect/>
-                      </a:stretch>
-                    </p:blipFill>
-                    <p:spPr bwMode="auto">
-                      <a:xfrm>
-                        <a:off x="39631" y="224908"/>
-                        <a:ext cx="5458905" cy="3666633"/>
-                      </a:xfrm>
-                      <a:prstGeom prst="rect">
-                        <a:avLst/>
-                      </a:prstGeom>
-                      <a:noFill/>
-                    </p:spPr>
-                  </p:pic>
-                </p:oleObj>
-              </mc:Fallback>
-            </mc:AlternateContent>
-          </a:graphicData>
-        </a:graphic>
-      </p:graphicFrame>
       <p:sp>
         <p:nvSpPr>
           <p:cNvPr id="6" name="Rectangle 3">
@@ -3633,81 +3584,72 @@
           </a:p>
         </p:txBody>
       </p:sp>
-      <p:sp>
-        <p:nvSpPr>
-          <p:cNvPr id="9" name="Rectangle 6">
-            <a:extLst>
-              <a:ext uri="{FF2B5EF4-FFF2-40B4-BE49-F238E27FC236}">
-                <a16:creationId xmlns:a16="http://schemas.microsoft.com/office/drawing/2014/main" id="{B69F900C-CF49-49C4-A214-D48245B1D325}"/>
-              </a:ext>
-            </a:extLst>
-          </p:cNvPr>
-          <p:cNvSpPr>
-            <a:spLocks noChangeArrowheads="1"/>
-          </p:cNvSpPr>
+      <p:pic>
+        <p:nvPicPr>
+          <p:cNvPr id="8" name="Picture 7">
+            <a:extLst>
+              <a:ext uri="{FF2B5EF4-FFF2-40B4-BE49-F238E27FC236}">
+                <a16:creationId xmlns:a16="http://schemas.microsoft.com/office/drawing/2014/main" id="{A3AD97B9-294B-4B21-895C-042BC17DEDF0}"/>
+              </a:ext>
+            </a:extLst>
+          </p:cNvPr>
+          <p:cNvPicPr>
+            <a:picLocks noChangeAspect="1"/>
+          </p:cNvPicPr>
           <p:nvPr/>
-        </p:nvSpPr>
-        <p:spPr bwMode="auto">
+        </p:nvPicPr>
+        <p:blipFill>
+          <a:blip r:embed="rId3"/>
+          <a:stretch>
+            <a:fillRect/>
+          </a:stretch>
+        </p:blipFill>
+        <p:spPr>
           <a:xfrm>
-            <a:off x="476739" y="5105400"/>
-            <a:ext cx="12192000" cy="0"/>
+            <a:off x="6522502" y="224908"/>
+            <a:ext cx="1742466" cy="2150612"/>
           </a:xfrm>
           <a:prstGeom prst="rect">
             <a:avLst/>
           </a:prstGeom>
-          <a:noFill/>
-          <a:ln>
-            <a:noFill/>
-          </a:ln>
-          <a:effectLst/>
-          <a:extLst>
-            <a:ext uri="{909E8E84-426E-40DD-AFC4-6F175D3DCCD1}">
-              <a14:hiddenFill xmlns:a14="http://schemas.microsoft.com/office/drawing/2010/main">
-                <a:solidFill>
-                  <a:schemeClr val="accent1"/>
-                </a:solidFill>
-              </a14:hiddenFill>
-            </a:ext>
-            <a:ext uri="{91240B29-F687-4F45-9708-019B960494DF}">
-              <a14:hiddenLine xmlns:a14="http://schemas.microsoft.com/office/drawing/2010/main" w="9525">
-                <a:solidFill>
-                  <a:schemeClr val="tx1"/>
-                </a:solidFill>
-                <a:miter lim="800000"/>
-                <a:headEnd/>
-                <a:tailEnd/>
-              </a14:hiddenLine>
-            </a:ext>
-            <a:ext uri="{AF507438-7753-43E0-B8FC-AC1667EBCBE1}">
-              <a14:hiddenEffects xmlns:a14="http://schemas.microsoft.com/office/drawing/2010/main">
-                <a:effectLst>
-                  <a:outerShdw dist="35921" dir="2700000" algn="ctr" rotWithShape="0">
-                    <a:schemeClr val="bg2"/>
-                  </a:outerShdw>
-                </a:effectLst>
-              </a14:hiddenEffects>
-            </a:ext>
-          </a:extLst>
         </p:spPr>
-        <p:txBody>
-          <a:bodyPr vert="horz" wrap="none" lIns="91440" tIns="45720" rIns="91440" bIns="45720" numCol="1" anchor="ctr" anchorCtr="0" compatLnSpc="1">
-            <a:prstTxWarp prst="textNoShape">
-              <a:avLst/>
-            </a:prstTxWarp>
-            <a:spAutoFit/>
-          </a:bodyPr>
-          <a:lstStyle/>
-          <a:p>
-            <a:endParaRPr lang="en-GB"/>
-          </a:p>
-        </p:txBody>
-      </p:sp>
+      </p:pic>
       <p:pic>
         <p:nvPicPr>
-          <p:cNvPr id="8" name="Picture 7">
-            <a:extLst>
-              <a:ext uri="{FF2B5EF4-FFF2-40B4-BE49-F238E27FC236}">
-                <a16:creationId xmlns:a16="http://schemas.microsoft.com/office/drawing/2014/main" id="{A3AD97B9-294B-4B21-895C-042BC17DEDF0}"/>
+          <p:cNvPr id="3" name="Picture 2" descr="A picture containing text, battery, electronics&#10;&#10;Description automatically generated">
+            <a:extLst>
+              <a:ext uri="{FF2B5EF4-FFF2-40B4-BE49-F238E27FC236}">
+                <a16:creationId xmlns:a16="http://schemas.microsoft.com/office/drawing/2014/main" id="{2FE8E882-A9D2-4833-8D20-7D5E3DB4063D}"/>
+              </a:ext>
+            </a:extLst>
+          </p:cNvPr>
+          <p:cNvPicPr>
+            <a:picLocks noChangeAspect="1"/>
+          </p:cNvPicPr>
+          <p:nvPr/>
+        </p:nvPicPr>
+        <p:blipFill>
+          <a:blip r:embed="rId4"/>
+          <a:stretch>
+            <a:fillRect/>
+          </a:stretch>
+        </p:blipFill>
+        <p:spPr>
+          <a:xfrm>
+            <a:off x="6539668" y="2574766"/>
+            <a:ext cx="1799789" cy="1429528"/>
+          </a:xfrm>
+          <a:prstGeom prst="rect">
+            <a:avLst/>
+          </a:prstGeom>
+        </p:spPr>
+      </p:pic>
+      <p:pic>
+        <p:nvPicPr>
+          <p:cNvPr id="12" name="Picture 11" descr="Text&#10;&#10;Description automatically generated">
+            <a:extLst>
+              <a:ext uri="{FF2B5EF4-FFF2-40B4-BE49-F238E27FC236}">
+                <a16:creationId xmlns:a16="http://schemas.microsoft.com/office/drawing/2014/main" id="{CA5DE84D-ADF1-4EFD-A34A-A27F72B99117}"/>
               </a:ext>
             </a:extLst>
           </p:cNvPr>
@@ -3724,67 +3666,7 @@
         </p:blipFill>
         <p:spPr>
           <a:xfrm>
-            <a:off x="5818312" y="224908"/>
-            <a:ext cx="1742466" cy="2150612"/>
-          </a:xfrm>
-          <a:prstGeom prst="rect">
-            <a:avLst/>
-          </a:prstGeom>
-        </p:spPr>
-      </p:pic>
-      <p:pic>
-        <p:nvPicPr>
-          <p:cNvPr id="3" name="Picture 2" descr="A picture containing text, battery, electronics&#10;&#10;Description automatically generated">
-            <a:extLst>
-              <a:ext uri="{FF2B5EF4-FFF2-40B4-BE49-F238E27FC236}">
-                <a16:creationId xmlns:a16="http://schemas.microsoft.com/office/drawing/2014/main" id="{2FE8E882-A9D2-4833-8D20-7D5E3DB4063D}"/>
-              </a:ext>
-            </a:extLst>
-          </p:cNvPr>
-          <p:cNvPicPr>
-            <a:picLocks noChangeAspect="1"/>
-          </p:cNvPicPr>
-          <p:nvPr/>
-        </p:nvPicPr>
-        <p:blipFill>
-          <a:blip r:embed="rId6"/>
-          <a:stretch>
-            <a:fillRect/>
-          </a:stretch>
-        </p:blipFill>
-        <p:spPr>
-          <a:xfrm>
-            <a:off x="5835478" y="2574766"/>
-            <a:ext cx="1799789" cy="1429528"/>
-          </a:xfrm>
-          <a:prstGeom prst="rect">
-            <a:avLst/>
-          </a:prstGeom>
-        </p:spPr>
-      </p:pic>
-      <p:pic>
-        <p:nvPicPr>
-          <p:cNvPr id="12" name="Picture 11" descr="Text&#10;&#10;Description automatically generated">
-            <a:extLst>
-              <a:ext uri="{FF2B5EF4-FFF2-40B4-BE49-F238E27FC236}">
-                <a16:creationId xmlns:a16="http://schemas.microsoft.com/office/drawing/2014/main" id="{CA5DE84D-ADF1-4EFD-A34A-A27F72B99117}"/>
-              </a:ext>
-            </a:extLst>
-          </p:cNvPr>
-          <p:cNvPicPr>
-            <a:picLocks noChangeAspect="1"/>
-          </p:cNvPicPr>
-          <p:nvPr/>
-        </p:nvPicPr>
-        <p:blipFill>
-          <a:blip r:embed="rId7"/>
-          <a:stretch>
-            <a:fillRect/>
-          </a:stretch>
-        </p:blipFill>
-        <p:spPr>
-          <a:xfrm>
-            <a:off x="7962936" y="350900"/>
+            <a:off x="8856311" y="350900"/>
             <a:ext cx="2160718" cy="3414647"/>
           </a:xfrm>
           <a:prstGeom prst="rect">
@@ -3806,8 +3688,8 @@
         </p:nvSpPr>
         <p:spPr>
           <a:xfrm>
-            <a:off x="4021336" y="9464"/>
-            <a:ext cx="564776" cy="430887"/>
+            <a:off x="5955230" y="9464"/>
+            <a:ext cx="564776" cy="400110"/>
           </a:xfrm>
           <a:prstGeom prst="rect">
             <a:avLst/>
@@ -3821,7 +3703,10 @@
           <a:lstStyle/>
           <a:p>
             <a:r>
-              <a:rPr lang="en-GB" sz="2200" dirty="0"/>
+              <a:rPr lang="en-GB" sz="2000" dirty="0">
+                <a:latin typeface="Arial" panose="020B0604020202020204" pitchFamily="34" charset="0"/>
+                <a:cs typeface="Arial" panose="020B0604020202020204" pitchFamily="34" charset="0"/>
+              </a:rPr>
               <a:t>a</a:t>
             </a:r>
           </a:p>
@@ -3841,8 +3726,8 @@
         </p:nvSpPr>
         <p:spPr>
           <a:xfrm>
-            <a:off x="7352879" y="40659"/>
-            <a:ext cx="564776" cy="430887"/>
+            <a:off x="8015334" y="9464"/>
+            <a:ext cx="564776" cy="400110"/>
           </a:xfrm>
           <a:prstGeom prst="rect">
             <a:avLst/>
@@ -3856,7 +3741,10 @@
           <a:lstStyle/>
           <a:p>
             <a:r>
-              <a:rPr lang="en-GB" sz="2200" dirty="0"/>
+              <a:rPr lang="en-GB" sz="2000" dirty="0">
+                <a:latin typeface="Arial" panose="020B0604020202020204" pitchFamily="34" charset="0"/>
+                <a:cs typeface="Arial" panose="020B0604020202020204" pitchFamily="34" charset="0"/>
+              </a:rPr>
               <a:t>b</a:t>
             </a:r>
           </a:p>
@@ -3876,8 +3764,8 @@
         </p:nvSpPr>
         <p:spPr>
           <a:xfrm>
-            <a:off x="7301143" y="2259668"/>
-            <a:ext cx="564776" cy="430887"/>
+            <a:off x="8015334" y="2259668"/>
+            <a:ext cx="564776" cy="400110"/>
           </a:xfrm>
           <a:prstGeom prst="rect">
             <a:avLst/>
@@ -3891,7 +3779,10 @@
           <a:lstStyle/>
           <a:p>
             <a:r>
-              <a:rPr lang="en-GB" sz="2200" dirty="0"/>
+              <a:rPr lang="en-GB" sz="2000" dirty="0">
+                <a:latin typeface="Arial" panose="020B0604020202020204" pitchFamily="34" charset="0"/>
+                <a:cs typeface="Arial" panose="020B0604020202020204" pitchFamily="34" charset="0"/>
+              </a:rPr>
               <a:t>c</a:t>
             </a:r>
           </a:p>
@@ -3911,8 +3802,8 @@
         </p:nvSpPr>
         <p:spPr>
           <a:xfrm>
-            <a:off x="9655895" y="86276"/>
-            <a:ext cx="564776" cy="430887"/>
+            <a:off x="10601905" y="9464"/>
+            <a:ext cx="564776" cy="400110"/>
           </a:xfrm>
           <a:prstGeom prst="rect">
             <a:avLst/>
@@ -3926,8 +3817,389 @@
           <a:lstStyle/>
           <a:p>
             <a:r>
-              <a:rPr lang="en-GB" sz="2200" dirty="0"/>
+              <a:rPr lang="en-GB" sz="2000" dirty="0">
+                <a:latin typeface="Arial" panose="020B0604020202020204" pitchFamily="34" charset="0"/>
+                <a:cs typeface="Arial" panose="020B0604020202020204" pitchFamily="34" charset="0"/>
+              </a:rPr>
               <a:t>d</a:t>
+            </a:r>
+          </a:p>
+        </p:txBody>
+      </p:sp>
+      <p:sp>
+        <p:nvSpPr>
+          <p:cNvPr id="2" name="TextBox 1">
+            <a:extLst>
+              <a:ext uri="{FF2B5EF4-FFF2-40B4-BE49-F238E27FC236}">
+                <a16:creationId xmlns:a16="http://schemas.microsoft.com/office/drawing/2014/main" id="{B5B73386-C63F-A0B4-528A-49DC09E6D31D}"/>
+              </a:ext>
+            </a:extLst>
+          </p:cNvPr>
+          <p:cNvSpPr txBox="1"/>
+          <p:nvPr/>
+        </p:nvSpPr>
+        <p:spPr>
+          <a:xfrm>
+            <a:off x="4152717" y="3532442"/>
+            <a:ext cx="1470482" cy="307777"/>
+          </a:xfrm>
+          <a:prstGeom prst="rect">
+            <a:avLst/>
+          </a:prstGeom>
+          <a:solidFill>
+            <a:schemeClr val="bg1"/>
+          </a:solidFill>
+        </p:spPr>
+        <p:txBody>
+          <a:bodyPr wrap="square" rtlCol="0">
+            <a:spAutoFit/>
+          </a:bodyPr>
+          <a:lstStyle/>
+          <a:p>
+            <a:pPr algn="r"/>
+            <a:r>
+              <a:rPr lang="en-GB" sz="1400" dirty="0">
+                <a:latin typeface="Arial" panose="020B0604020202020204" pitchFamily="34" charset="0"/>
+                <a:cs typeface="Arial" panose="020B0604020202020204" pitchFamily="34" charset="0"/>
+              </a:rPr>
+              <a:t>H</a:t>
+            </a:r>
+            <a:r>
+              <a:rPr lang="en-GB" sz="1400" baseline="-25000" dirty="0">
+                <a:latin typeface="Arial" panose="020B0604020202020204" pitchFamily="34" charset="0"/>
+                <a:cs typeface="Arial" panose="020B0604020202020204" pitchFamily="34" charset="0"/>
+              </a:rPr>
+              <a:t>2</a:t>
+            </a:r>
+            <a:r>
+              <a:rPr lang="en-GB" sz="1400" dirty="0">
+                <a:latin typeface="Arial" panose="020B0604020202020204" pitchFamily="34" charset="0"/>
+                <a:cs typeface="Arial" panose="020B0604020202020204" pitchFamily="34" charset="0"/>
+              </a:rPr>
+              <a:t>O + H</a:t>
+            </a:r>
+            <a:r>
+              <a:rPr lang="en-GB" sz="1400" baseline="-25000" dirty="0">
+                <a:latin typeface="Arial" panose="020B0604020202020204" pitchFamily="34" charset="0"/>
+                <a:cs typeface="Arial" panose="020B0604020202020204" pitchFamily="34" charset="0"/>
+              </a:rPr>
+              <a:t>2</a:t>
+            </a:r>
+            <a:r>
+              <a:rPr lang="en-GB" sz="1400" dirty="0">
+                <a:latin typeface="Arial" panose="020B0604020202020204" pitchFamily="34" charset="0"/>
+                <a:cs typeface="Arial" panose="020B0604020202020204" pitchFamily="34" charset="0"/>
+              </a:rPr>
+              <a:t>SO</a:t>
+            </a:r>
+            <a:r>
+              <a:rPr lang="en-GB" sz="1400" baseline="-25000" dirty="0">
+                <a:latin typeface="Arial" panose="020B0604020202020204" pitchFamily="34" charset="0"/>
+                <a:cs typeface="Arial" panose="020B0604020202020204" pitchFamily="34" charset="0"/>
+              </a:rPr>
+              <a:t>4</a:t>
+            </a:r>
+          </a:p>
+        </p:txBody>
+      </p:sp>
+      <p:sp>
+        <p:nvSpPr>
+          <p:cNvPr id="9" name="TextBox 8">
+            <a:extLst>
+              <a:ext uri="{FF2B5EF4-FFF2-40B4-BE49-F238E27FC236}">
+                <a16:creationId xmlns:a16="http://schemas.microsoft.com/office/drawing/2014/main" id="{A99E967E-BDA1-07CB-9572-6A01FA188A0D}"/>
+              </a:ext>
+            </a:extLst>
+          </p:cNvPr>
+          <p:cNvSpPr txBox="1"/>
+          <p:nvPr/>
+        </p:nvSpPr>
+        <p:spPr>
+          <a:xfrm>
+            <a:off x="4587825" y="1012236"/>
+            <a:ext cx="1848087" cy="307777"/>
+          </a:xfrm>
+          <a:prstGeom prst="rect">
+            <a:avLst/>
+          </a:prstGeom>
+          <a:solidFill>
+            <a:schemeClr val="bg1"/>
+          </a:solidFill>
+        </p:spPr>
+        <p:txBody>
+          <a:bodyPr wrap="square" rtlCol="0">
+            <a:spAutoFit/>
+          </a:bodyPr>
+          <a:lstStyle/>
+          <a:p>
+            <a:r>
+              <a:rPr lang="en-GB" sz="1400" dirty="0">
+                <a:latin typeface="Arial" panose="020B0604020202020204" pitchFamily="34" charset="0"/>
+                <a:cs typeface="Arial" panose="020B0604020202020204" pitchFamily="34" charset="0"/>
+              </a:rPr>
+              <a:t>negative terminal</a:t>
+            </a:r>
+          </a:p>
+        </p:txBody>
+      </p:sp>
+      <p:sp>
+        <p:nvSpPr>
+          <p:cNvPr id="11" name="TextBox 10">
+            <a:extLst>
+              <a:ext uri="{FF2B5EF4-FFF2-40B4-BE49-F238E27FC236}">
+                <a16:creationId xmlns:a16="http://schemas.microsoft.com/office/drawing/2014/main" id="{19FE5142-5B08-CA94-923D-BA6A7A491CCA}"/>
+              </a:ext>
+            </a:extLst>
+          </p:cNvPr>
+          <p:cNvSpPr txBox="1"/>
+          <p:nvPr/>
+        </p:nvSpPr>
+        <p:spPr>
+          <a:xfrm>
+            <a:off x="2800105" y="353565"/>
+            <a:ext cx="1700602" cy="307777"/>
+          </a:xfrm>
+          <a:prstGeom prst="rect">
+            <a:avLst/>
+          </a:prstGeom>
+          <a:solidFill>
+            <a:schemeClr val="bg1"/>
+          </a:solidFill>
+        </p:spPr>
+        <p:txBody>
+          <a:bodyPr wrap="square" rtlCol="0">
+            <a:spAutoFit/>
+          </a:bodyPr>
+          <a:lstStyle/>
+          <a:p>
+            <a:r>
+              <a:rPr lang="en-GB" sz="1400" dirty="0">
+                <a:latin typeface="Arial" panose="020B0604020202020204" pitchFamily="34" charset="0"/>
+                <a:cs typeface="Arial" panose="020B0604020202020204" pitchFamily="34" charset="0"/>
+              </a:rPr>
+              <a:t>positive terminal</a:t>
+            </a:r>
+          </a:p>
+        </p:txBody>
+      </p:sp>
+      <p:sp>
+        <p:nvSpPr>
+          <p:cNvPr id="17" name="TextBox 16">
+            <a:extLst>
+              <a:ext uri="{FF2B5EF4-FFF2-40B4-BE49-F238E27FC236}">
+                <a16:creationId xmlns:a16="http://schemas.microsoft.com/office/drawing/2014/main" id="{71355BC1-AE06-0379-5015-204B5C125764}"/>
+              </a:ext>
+            </a:extLst>
+          </p:cNvPr>
+          <p:cNvSpPr txBox="1"/>
+          <p:nvPr/>
+        </p:nvSpPr>
+        <p:spPr>
+          <a:xfrm>
+            <a:off x="4353534" y="1659485"/>
+            <a:ext cx="1742466" cy="307777"/>
+          </a:xfrm>
+          <a:prstGeom prst="rect">
+            <a:avLst/>
+          </a:prstGeom>
+          <a:solidFill>
+            <a:schemeClr val="bg1"/>
+          </a:solidFill>
+        </p:spPr>
+        <p:txBody>
+          <a:bodyPr wrap="square" rtlCol="0">
+            <a:spAutoFit/>
+          </a:bodyPr>
+          <a:lstStyle/>
+          <a:p>
+            <a:pPr algn="r"/>
+            <a:r>
+              <a:rPr lang="en-GB" sz="1400" dirty="0">
+                <a:latin typeface="Arial" panose="020B0604020202020204" pitchFamily="34" charset="0"/>
+                <a:cs typeface="Arial" panose="020B0604020202020204" pitchFamily="34" charset="0"/>
+              </a:rPr>
+              <a:t>negative electrode</a:t>
+            </a:r>
+          </a:p>
+        </p:txBody>
+      </p:sp>
+      <p:sp>
+        <p:nvSpPr>
+          <p:cNvPr id="19" name="Rectangle 18">
+            <a:extLst>
+              <a:ext uri="{FF2B5EF4-FFF2-40B4-BE49-F238E27FC236}">
+                <a16:creationId xmlns:a16="http://schemas.microsoft.com/office/drawing/2014/main" id="{93AF3427-8544-7B7A-6337-EAD1AAD6240C}"/>
+              </a:ext>
+            </a:extLst>
+          </p:cNvPr>
+          <p:cNvSpPr/>
+          <p:nvPr/>
+        </p:nvSpPr>
+        <p:spPr>
+          <a:xfrm>
+            <a:off x="4414614" y="2023078"/>
+            <a:ext cx="1681386" cy="131539"/>
+          </a:xfrm>
+          <a:prstGeom prst="rect">
+            <a:avLst/>
+          </a:prstGeom>
+          <a:solidFill>
+            <a:schemeClr val="bg1"/>
+          </a:solidFill>
+          <a:ln>
+            <a:noFill/>
+          </a:ln>
+        </p:spPr>
+        <p:style>
+          <a:lnRef idx="2">
+            <a:schemeClr val="accent1">
+              <a:shade val="50000"/>
+            </a:schemeClr>
+          </a:lnRef>
+          <a:fillRef idx="1">
+            <a:schemeClr val="accent1"/>
+          </a:fillRef>
+          <a:effectRef idx="0">
+            <a:schemeClr val="accent1"/>
+          </a:effectRef>
+          <a:fontRef idx="minor">
+            <a:schemeClr val="lt1"/>
+          </a:fontRef>
+        </p:style>
+        <p:txBody>
+          <a:bodyPr rtlCol="0" anchor="ctr"/>
+          <a:lstStyle/>
+          <a:p>
+            <a:pPr algn="ctr"/>
+            <a:endParaRPr lang="en-GB"/>
+          </a:p>
+        </p:txBody>
+      </p:sp>
+      <p:sp>
+        <p:nvSpPr>
+          <p:cNvPr id="18" name="TextBox 17">
+            <a:extLst>
+              <a:ext uri="{FF2B5EF4-FFF2-40B4-BE49-F238E27FC236}">
+                <a16:creationId xmlns:a16="http://schemas.microsoft.com/office/drawing/2014/main" id="{CB501C96-23BC-37EE-79C5-670303FFBEDD}"/>
+              </a:ext>
+            </a:extLst>
+          </p:cNvPr>
+          <p:cNvSpPr txBox="1"/>
+          <p:nvPr/>
+        </p:nvSpPr>
+        <p:spPr>
+          <a:xfrm>
+            <a:off x="4512623" y="1957483"/>
+            <a:ext cx="1586805" cy="307777"/>
+          </a:xfrm>
+          <a:prstGeom prst="rect">
+            <a:avLst/>
+          </a:prstGeom>
+          <a:noFill/>
+        </p:spPr>
+        <p:txBody>
+          <a:bodyPr wrap="square" rtlCol="0">
+            <a:spAutoFit/>
+          </a:bodyPr>
+          <a:lstStyle/>
+          <a:p>
+            <a:pPr algn="r"/>
+            <a:r>
+              <a:rPr lang="en-GB" sz="1400" dirty="0">
+                <a:latin typeface="Arial" panose="020B0604020202020204" pitchFamily="34" charset="0"/>
+                <a:cs typeface="Arial" panose="020B0604020202020204" pitchFamily="34" charset="0"/>
+              </a:rPr>
+              <a:t>positive electrode</a:t>
+            </a:r>
+          </a:p>
+        </p:txBody>
+      </p:sp>
+      <p:sp>
+        <p:nvSpPr>
+          <p:cNvPr id="21" name="Rectangle 20">
+            <a:extLst>
+              <a:ext uri="{FF2B5EF4-FFF2-40B4-BE49-F238E27FC236}">
+                <a16:creationId xmlns:a16="http://schemas.microsoft.com/office/drawing/2014/main" id="{72244D79-85B1-1E42-1F49-713671A0348E}"/>
+              </a:ext>
+            </a:extLst>
+          </p:cNvPr>
+          <p:cNvSpPr/>
+          <p:nvPr/>
+        </p:nvSpPr>
+        <p:spPr>
+          <a:xfrm>
+            <a:off x="2132096" y="4164672"/>
+            <a:ext cx="668009" cy="345200"/>
+          </a:xfrm>
+          <a:prstGeom prst="rect">
+            <a:avLst/>
+          </a:prstGeom>
+          <a:solidFill>
+            <a:schemeClr val="bg1"/>
+          </a:solidFill>
+          <a:ln>
+            <a:noFill/>
+          </a:ln>
+        </p:spPr>
+        <p:style>
+          <a:lnRef idx="2">
+            <a:schemeClr val="accent1">
+              <a:shade val="50000"/>
+            </a:schemeClr>
+          </a:lnRef>
+          <a:fillRef idx="1">
+            <a:schemeClr val="accent1"/>
+          </a:fillRef>
+          <a:effectRef idx="0">
+            <a:schemeClr val="accent1"/>
+          </a:effectRef>
+          <a:fontRef idx="minor">
+            <a:schemeClr val="lt1"/>
+          </a:fontRef>
+        </p:style>
+        <p:txBody>
+          <a:bodyPr rtlCol="0" anchor="ctr"/>
+          <a:lstStyle/>
+          <a:p>
+            <a:pPr algn="ctr"/>
+            <a:endParaRPr lang="en-GB"/>
+          </a:p>
+        </p:txBody>
+      </p:sp>
+      <p:sp>
+        <p:nvSpPr>
+          <p:cNvPr id="20" name="TextBox 19">
+            <a:extLst>
+              <a:ext uri="{FF2B5EF4-FFF2-40B4-BE49-F238E27FC236}">
+                <a16:creationId xmlns:a16="http://schemas.microsoft.com/office/drawing/2014/main" id="{E065B1D1-D9D9-57F5-FDB7-16D65BE94B40}"/>
+              </a:ext>
+            </a:extLst>
+          </p:cNvPr>
+          <p:cNvSpPr txBox="1"/>
+          <p:nvPr/>
+        </p:nvSpPr>
+        <p:spPr>
+          <a:xfrm>
+            <a:off x="2381709" y="4115443"/>
+            <a:ext cx="529656" cy="307777"/>
+          </a:xfrm>
+          <a:prstGeom prst="rect">
+            <a:avLst/>
+          </a:prstGeom>
+          <a:noFill/>
+        </p:spPr>
+        <p:txBody>
+          <a:bodyPr wrap="square" rtlCol="0">
+            <a:spAutoFit/>
+          </a:bodyPr>
+          <a:lstStyle/>
+          <a:p>
+            <a:r>
+              <a:rPr lang="en-GB" sz="1400" dirty="0">
+                <a:latin typeface="Arial" panose="020B0604020202020204" pitchFamily="34" charset="0"/>
+                <a:cs typeface="Arial" panose="020B0604020202020204" pitchFamily="34" charset="0"/>
+              </a:rPr>
+              <a:t>cell</a:t>
             </a:r>
           </a:p>
         </p:txBody>
@@ -3935,7 +4207,7 @@
     </p:spTree>
     <p:extLst>
       <p:ext uri="{BB962C8B-B14F-4D97-AF65-F5344CB8AC3E}">
-        <p14:creationId xmlns:p14="http://schemas.microsoft.com/office/powerpoint/2010/main" val="978102373"/>
+        <p14:creationId xmlns:p14="http://schemas.microsoft.com/office/powerpoint/2010/main" val="746281584"/>
       </p:ext>
     </p:extLst>
   </p:cSld>

</xml_diff>